<commit_message>
useful URLs that discuss potential metrics calculations
</commit_message>
<xml_diff>
--- a/docs/Simple Jira Agile Metrics via Python and SQL (and Azure).pptx
+++ b/docs/Simple Jira Agile Metrics via Python and SQL (and Azure).pptx
@@ -18,6 +18,8 @@
     <p:sldId id="265" r:id="rId12"/>
     <p:sldId id="264" r:id="rId13"/>
     <p:sldId id="266" r:id="rId14"/>
+    <p:sldId id="267" r:id="rId15"/>
+    <p:sldId id="272" r:id="rId16"/>
   </p:sldIdLst>
   <p:sldSz cx="12192000" cy="6858000"/>
   <p:notesSz cx="6858000" cy="9144000"/>
@@ -4088,6 +4090,379 @@
 </p:sld>
 </file>
 
+<file path=ppt/slides/slide14.xml><?xml version="1.0" encoding="utf-8"?>
+<p:sld xmlns:a="http://schemas.openxmlformats.org/drawingml/2006/main" xmlns:r="http://schemas.openxmlformats.org/officeDocument/2006/relationships" xmlns:p="http://schemas.openxmlformats.org/presentationml/2006/main">
+  <p:cSld>
+    <p:bg>
+      <p:bgPr>
+        <a:solidFill>
+          <a:schemeClr val="accent2">
+            <a:lumMod val="40000"/>
+            <a:lumOff val="60000"/>
+          </a:schemeClr>
+        </a:solidFill>
+        <a:effectLst/>
+      </p:bgPr>
+    </p:bg>
+    <p:spTree>
+      <p:nvGrpSpPr>
+        <p:cNvPr id="1" name=""/>
+        <p:cNvGrpSpPr/>
+        <p:nvPr/>
+      </p:nvGrpSpPr>
+      <p:grpSpPr>
+        <a:xfrm>
+          <a:off x="0" y="0"/>
+          <a:ext cx="0" cy="0"/>
+          <a:chOff x="0" y="0"/>
+          <a:chExt cx="0" cy="0"/>
+        </a:xfrm>
+      </p:grpSpPr>
+      <p:sp>
+        <p:nvSpPr>
+          <p:cNvPr id="2" name="Title 1">
+            <a:extLst>
+              <a:ext uri="{FF2B5EF4-FFF2-40B4-BE49-F238E27FC236}">
+                <a16:creationId xmlns:a16="http://schemas.microsoft.com/office/drawing/2014/main" id="{A3D4A002-0E4C-4DAC-BCDA-8D71B5F72E14}"/>
+              </a:ext>
+            </a:extLst>
+          </p:cNvPr>
+          <p:cNvSpPr>
+            <a:spLocks noGrp="1"/>
+          </p:cNvSpPr>
+          <p:nvPr>
+            <p:ph type="title"/>
+          </p:nvPr>
+        </p:nvSpPr>
+        <p:spPr>
+          <a:xfrm>
+            <a:off x="784932" y="223078"/>
+            <a:ext cx="10515600" cy="726828"/>
+          </a:xfrm>
+        </p:spPr>
+        <p:txBody>
+          <a:bodyPr/>
+          <a:lstStyle/>
+          <a:p>
+            <a:r>
+              <a:rPr lang="en-US" dirty="0"/>
+              <a:t>Appendix C: Other Metrics?</a:t>
+            </a:r>
+          </a:p>
+        </p:txBody>
+      </p:sp>
+      <p:sp>
+        <p:nvSpPr>
+          <p:cNvPr id="3" name="Content Placeholder 2">
+            <a:extLst>
+              <a:ext uri="{FF2B5EF4-FFF2-40B4-BE49-F238E27FC236}">
+                <a16:creationId xmlns:a16="http://schemas.microsoft.com/office/drawing/2014/main" id="{75FD253A-DD71-48BB-A32A-BBB995B0AE6B}"/>
+              </a:ext>
+            </a:extLst>
+          </p:cNvPr>
+          <p:cNvSpPr>
+            <a:spLocks noGrp="1"/>
+          </p:cNvSpPr>
+          <p:nvPr>
+            <p:ph idx="1"/>
+          </p:nvPr>
+        </p:nvSpPr>
+        <p:spPr>
+          <a:xfrm>
+            <a:off x="488272" y="1234002"/>
+            <a:ext cx="11194742" cy="5557421"/>
+          </a:xfrm>
+        </p:spPr>
+        <p:txBody>
+          <a:bodyPr>
+            <a:normAutofit fontScale="85000" lnSpcReduction="20000"/>
+          </a:bodyPr>
+          <a:lstStyle/>
+          <a:p>
+            <a:r>
+              <a:rPr lang="en-US" sz="2400" dirty="0"/>
+              <a:t>Things that you can potentially calculate (either via the below or the way you want) once you get all your Jira data into a </a:t>
+            </a:r>
+            <a:r>
+              <a:rPr lang="en-US" sz="2400"/>
+              <a:t>SQL database:</a:t>
+            </a:r>
+          </a:p>
+          <a:p>
+            <a:r>
+              <a:rPr lang="en-US" sz="2400" dirty="0"/>
+              <a:t>Cycle Time:</a:t>
+            </a:r>
+          </a:p>
+          <a:p>
+            <a:pPr lvl="1"/>
+            <a:r>
+              <a:rPr lang="en-US" sz="1800" dirty="0">
+                <a:hlinkClick r:id="rId2"/>
+              </a:rPr>
+              <a:t>https://community.atlassian.com/t5/Jira-discussions/Understanding-the-Cycle-Time-of-Epics-in-Jira/td-p/621785</a:t>
+            </a:r>
+            <a:endParaRPr lang="en-US" sz="1800" dirty="0"/>
+          </a:p>
+          <a:p>
+            <a:pPr lvl="1"/>
+            <a:r>
+              <a:rPr lang="en-US" sz="1800" dirty="0"/>
+              <a:t>Generally defined as time “In Progress”</a:t>
+            </a:r>
+          </a:p>
+          <a:p>
+            <a:pPr lvl="1"/>
+            <a:r>
+              <a:rPr lang="en-US" sz="1800" dirty="0">
+                <a:hlinkClick r:id="rId3"/>
+              </a:rPr>
+              <a:t>https://codeclimate.com/blog/software-engineering-cycle-time/</a:t>
+            </a:r>
+            <a:endParaRPr lang="en-US" sz="1800" dirty="0"/>
+          </a:p>
+          <a:p>
+            <a:pPr lvl="1"/>
+            <a:r>
+              <a:rPr lang="en-US" sz="1800" dirty="0"/>
+              <a:t>More specifically, could be from first commit to date moved to Done (assume Done = deployment)</a:t>
+            </a:r>
+          </a:p>
+          <a:p>
+            <a:pPr lvl="1"/>
+            <a:r>
+              <a:rPr lang="en-US" sz="1800" dirty="0"/>
+              <a:t>SCM tools that integrate with Jira (e.g. Git Integration for Jira) sometimes add custom “</a:t>
+            </a:r>
+            <a:r>
+              <a:rPr lang="en-US" sz="1800" dirty="0" err="1"/>
+              <a:t>cf</a:t>
+            </a:r>
+            <a:r>
+              <a:rPr lang="en-US" sz="1800" dirty="0"/>
+              <a:t>[]” fields for SCM metadata like commit info</a:t>
+            </a:r>
+          </a:p>
+          <a:p>
+            <a:r>
+              <a:rPr lang="en-US" sz="2400" dirty="0"/>
+              <a:t>Release Frequency/Interval:</a:t>
+            </a:r>
+          </a:p>
+          <a:p>
+            <a:pPr lvl="1"/>
+            <a:r>
+              <a:rPr lang="en-US" sz="1800" dirty="0"/>
+              <a:t>Look at Jira Versions, see what dates they or their constituent issues are moved to Done and perhaps correlate them with change management data?</a:t>
+            </a:r>
+          </a:p>
+          <a:p>
+            <a:r>
+              <a:rPr lang="en-US" sz="2400" dirty="0"/>
+              <a:t>Change Size:</a:t>
+            </a:r>
+          </a:p>
+          <a:p>
+            <a:pPr lvl="1"/>
+            <a:r>
+              <a:rPr lang="en-US" sz="1800" dirty="0"/>
+              <a:t>Number of contained issues in a Version, Epic or Sprint	</a:t>
+            </a:r>
+          </a:p>
+          <a:p>
+            <a:pPr lvl="1"/>
+            <a:r>
+              <a:rPr lang="en-US" sz="1800" dirty="0"/>
+              <a:t>Different from story point total? Number of total final SCM commits? (very coarse)</a:t>
+            </a:r>
+          </a:p>
+          <a:p>
+            <a:r>
+              <a:rPr lang="en-US" sz="2400" dirty="0"/>
+              <a:t>Velocity:</a:t>
+            </a:r>
+          </a:p>
+          <a:p>
+            <a:pPr lvl="1"/>
+            <a:r>
+              <a:rPr lang="en-US" sz="1800" dirty="0">
+                <a:hlinkClick r:id="rId4"/>
+              </a:rPr>
+              <a:t>https://coalition.agileuprising.com/t/normalizing-story-points-across-an-art/927/9</a:t>
+            </a:r>
+            <a:endParaRPr lang="en-US" sz="1800" dirty="0"/>
+          </a:p>
+          <a:p>
+            <a:pPr lvl="1"/>
+            <a:r>
+              <a:rPr lang="en-US" sz="1800" dirty="0"/>
+              <a:t>For a change of pace, normalize by team size, say, over a 12 month period?</a:t>
+            </a:r>
+          </a:p>
+          <a:p>
+            <a:r>
+              <a:rPr lang="en-US" sz="2400" dirty="0"/>
+              <a:t>Defect Density per Cycle:</a:t>
+            </a:r>
+          </a:p>
+          <a:p>
+            <a:pPr lvl="1"/>
+            <a:r>
+              <a:rPr lang="en-US" sz="1700" dirty="0">
+                <a:hlinkClick r:id="rId5"/>
+              </a:rPr>
+              <a:t>https://www.guru99.com/defect-density-software-testing-terminology.html</a:t>
+            </a:r>
+            <a:endParaRPr lang="en-US" sz="1700" dirty="0"/>
+          </a:p>
+          <a:p>
+            <a:pPr lvl="1"/>
+            <a:r>
+              <a:rPr lang="en-US" sz="1800" dirty="0"/>
+              <a:t>Number of Bug issues in a sprint (or Epic?) divided by total issues</a:t>
+            </a:r>
+          </a:p>
+        </p:txBody>
+      </p:sp>
+    </p:spTree>
+    <p:extLst>
+      <p:ext uri="{BB962C8B-B14F-4D97-AF65-F5344CB8AC3E}">
+        <p14:creationId xmlns:p14="http://schemas.microsoft.com/office/powerpoint/2010/main" val="3497809227"/>
+      </p:ext>
+    </p:extLst>
+  </p:cSld>
+  <p:clrMapOvr>
+    <a:masterClrMapping/>
+  </p:clrMapOvr>
+</p:sld>
+</file>
+
+<file path=ppt/slides/slide15.xml><?xml version="1.0" encoding="utf-8"?>
+<p:sld xmlns:a="http://schemas.openxmlformats.org/drawingml/2006/main" xmlns:r="http://schemas.openxmlformats.org/officeDocument/2006/relationships" xmlns:p="http://schemas.openxmlformats.org/presentationml/2006/main">
+  <p:cSld>
+    <p:bg>
+      <p:bgPr>
+        <a:solidFill>
+          <a:schemeClr val="accent2">
+            <a:lumMod val="40000"/>
+            <a:lumOff val="60000"/>
+          </a:schemeClr>
+        </a:solidFill>
+        <a:effectLst/>
+      </p:bgPr>
+    </p:bg>
+    <p:spTree>
+      <p:nvGrpSpPr>
+        <p:cNvPr id="1" name=""/>
+        <p:cNvGrpSpPr/>
+        <p:nvPr/>
+      </p:nvGrpSpPr>
+      <p:grpSpPr>
+        <a:xfrm>
+          <a:off x="0" y="0"/>
+          <a:ext cx="0" cy="0"/>
+          <a:chOff x="0" y="0"/>
+          <a:chExt cx="0" cy="0"/>
+        </a:xfrm>
+      </p:grpSpPr>
+      <p:sp>
+        <p:nvSpPr>
+          <p:cNvPr id="2" name="Title 1">
+            <a:extLst>
+              <a:ext uri="{FF2B5EF4-FFF2-40B4-BE49-F238E27FC236}">
+                <a16:creationId xmlns:a16="http://schemas.microsoft.com/office/drawing/2014/main" id="{A3D4A002-0E4C-4DAC-BCDA-8D71B5F72E14}"/>
+              </a:ext>
+            </a:extLst>
+          </p:cNvPr>
+          <p:cNvSpPr>
+            <a:spLocks noGrp="1"/>
+          </p:cNvSpPr>
+          <p:nvPr>
+            <p:ph type="title"/>
+          </p:nvPr>
+        </p:nvSpPr>
+        <p:spPr>
+          <a:xfrm>
+            <a:off x="784932" y="223078"/>
+            <a:ext cx="10515600" cy="726828"/>
+          </a:xfrm>
+        </p:spPr>
+        <p:txBody>
+          <a:bodyPr/>
+          <a:lstStyle/>
+          <a:p>
+            <a:r>
+              <a:rPr lang="en-US" dirty="0"/>
+              <a:t>Appendix D: Similar Libraries</a:t>
+            </a:r>
+          </a:p>
+        </p:txBody>
+      </p:sp>
+      <p:sp>
+        <p:nvSpPr>
+          <p:cNvPr id="3" name="Content Placeholder 2">
+            <a:extLst>
+              <a:ext uri="{FF2B5EF4-FFF2-40B4-BE49-F238E27FC236}">
+                <a16:creationId xmlns:a16="http://schemas.microsoft.com/office/drawing/2014/main" id="{75FD253A-DD71-48BB-A32A-BBB995B0AE6B}"/>
+              </a:ext>
+            </a:extLst>
+          </p:cNvPr>
+          <p:cNvSpPr>
+            <a:spLocks noGrp="1"/>
+          </p:cNvSpPr>
+          <p:nvPr>
+            <p:ph idx="1"/>
+          </p:nvPr>
+        </p:nvSpPr>
+        <p:spPr>
+          <a:xfrm>
+            <a:off x="488272" y="1234002"/>
+            <a:ext cx="11194742" cy="5557421"/>
+          </a:xfrm>
+        </p:spPr>
+        <p:txBody>
+          <a:bodyPr>
+            <a:normAutofit/>
+          </a:bodyPr>
+          <a:lstStyle/>
+          <a:p>
+            <a:r>
+              <a:rPr lang="en-US" sz="2400" dirty="0">
+                <a:hlinkClick r:id="rId2"/>
+              </a:rPr>
+              <a:t>https://github.com/DeloitteDigitalUK</a:t>
+            </a:r>
+            <a:endParaRPr lang="en-US" sz="2400" dirty="0"/>
+          </a:p>
+          <a:p>
+            <a:pPr lvl="1"/>
+            <a:r>
+              <a:rPr lang="en-US" sz="1400" dirty="0"/>
+              <a:t>Good graphics capabilities, web server in container</a:t>
+            </a:r>
+          </a:p>
+          <a:p>
+            <a:pPr lvl="1"/>
+            <a:r>
+              <a:rPr lang="en-US" sz="1400" dirty="0"/>
+              <a:t>Predefined metrics</a:t>
+            </a:r>
+          </a:p>
+        </p:txBody>
+      </p:sp>
+    </p:spTree>
+    <p:extLst>
+      <p:ext uri="{BB962C8B-B14F-4D97-AF65-F5344CB8AC3E}">
+        <p14:creationId xmlns:p14="http://schemas.microsoft.com/office/powerpoint/2010/main" val="542943430"/>
+      </p:ext>
+    </p:extLst>
+  </p:cSld>
+  <p:clrMapOvr>
+    <a:masterClrMapping/>
+  </p:clrMapOvr>
+</p:sld>
+</file>
+
 <file path=ppt/slides/slide2.xml><?xml version="1.0" encoding="utf-8"?>
 <p:sld xmlns:a="http://schemas.openxmlformats.org/drawingml/2006/main" xmlns:r="http://schemas.openxmlformats.org/officeDocument/2006/relationships" xmlns:p="http://schemas.openxmlformats.org/presentationml/2006/main">
   <p:cSld>
@@ -4173,7 +4548,7 @@
         </p:spPr>
         <p:txBody>
           <a:bodyPr>
-            <a:normAutofit fontScale="92500" lnSpcReduction="20000"/>
+            <a:normAutofit fontScale="85000" lnSpcReduction="20000"/>
           </a:bodyPr>
           <a:lstStyle/>
           <a:p>
@@ -4264,7 +4639,14 @@
             <a:pPr lvl="1"/>
             <a:r>
               <a:rPr lang="en-US" sz="2600" dirty="0"/>
-              <a:t>Appendices A (Azure Infra), B (Jira-Python access)</a:t>
+              <a:t>Appendices:</a:t>
+            </a:r>
+          </a:p>
+          <a:p>
+            <a:pPr lvl="2"/>
+            <a:r>
+              <a:rPr lang="en-US" sz="2200" dirty="0"/>
+              <a:t>A (Azure Infra), B (Jira-Python access), C (other metrics), D (similar libraries)</a:t>
             </a:r>
           </a:p>
         </p:txBody>
@@ -5291,35 +5673,44 @@
           <a:p>
             <a:pPr lvl="2"/>
             <a:r>
+              <a:rPr lang="en-US" sz="1300" dirty="0">
+                <a:hlinkClick r:id="rId2"/>
+              </a:rPr>
+              <a:t>https://community.atlassian.com/t5/Jira-discussions/Understanding-the-Cycle-Time-of-Epics-in-Jira/td-p/621785</a:t>
+            </a:r>
+            <a:endParaRPr lang="en-US" sz="1300" dirty="0"/>
+          </a:p>
+          <a:p>
+            <a:pPr lvl="2"/>
+            <a:r>
+              <a:rPr lang="en-US" sz="1700" dirty="0"/>
+              <a:t>For Kanban/Lean, compare date added to Backlog to date moved to Done (Not always the same as JQL “</a:t>
+            </a:r>
+            <a:r>
+              <a:rPr lang="en-US" sz="1700" dirty="0" err="1"/>
+              <a:t>fixversion</a:t>
+            </a:r>
+            <a:r>
+              <a:rPr lang="en-US" sz="1700" dirty="0"/>
+              <a:t> changed”)</a:t>
+            </a:r>
+          </a:p>
+          <a:p>
+            <a:pPr lvl="2"/>
+            <a:r>
               <a:rPr lang="en-US" sz="1700" dirty="0"/>
               <a:t>For Scrum, compare date issue inserted into Sprint, to date moved to Done (assume Done date = deployment date)</a:t>
             </a:r>
           </a:p>
           <a:p>
-            <a:pPr lvl="2"/>
-            <a:r>
-              <a:rPr lang="en-US" sz="1700" dirty="0"/>
-              <a:t>For Kanban/Lean, compare date added to Backlog to date moved to Done (Not always the same as JQL “</a:t>
-            </a:r>
-            <a:r>
-              <a:rPr lang="en-US" sz="1700" dirty="0" err="1"/>
-              <a:t>fixversion</a:t>
-            </a:r>
-            <a:r>
-              <a:rPr lang="en-US" sz="1700" dirty="0"/>
-              <a:t> changed”)</a:t>
-            </a:r>
-            <a:endParaRPr lang="en-US" sz="2400" dirty="0"/>
-          </a:p>
-          <a:p>
-            <a:r>
-              <a:rPr lang="en-US" sz="2400" dirty="0"/>
+            <a:r>
+              <a:rPr lang="en-US" sz="2200" dirty="0"/>
               <a:t>QUICK CODE DEMO of SQL SP + SSRS REPORT</a:t>
             </a:r>
           </a:p>
           <a:p>
             <a:r>
-              <a:rPr lang="en-US" sz="2400" dirty="0"/>
+              <a:rPr lang="en-US" sz="2200" dirty="0"/>
               <a:t>The CHANGELOG option (to get History) in the REST API is key for many interesting Agile metrics</a:t>
             </a:r>
           </a:p>

</xml_diff>

<commit_message>
useful URLs that discuss potential metrics calculations, take 2
</commit_message>
<xml_diff>
--- a/docs/Simple Jira Agile Metrics via Python and SQL (and Azure).pptx
+++ b/docs/Simple Jira Agile Metrics via Python and SQL (and Azure).pptx
@@ -1,6 +1,6 @@
 
 <file path=ppt/presentation.xml><?xml version="1.0" encoding="utf-8"?>
-<p:presentation xmlns:a="http://schemas.openxmlformats.org/drawingml/2006/main" xmlns:r="http://schemas.openxmlformats.org/officeDocument/2006/relationships" xmlns:p="http://schemas.openxmlformats.org/presentationml/2006/main" saveSubsetFonts="1">
+<p:presentation xmlns:a="http://schemas.openxmlformats.org/drawingml/2006/main" xmlns:r="http://schemas.openxmlformats.org/officeDocument/2006/relationships" xmlns:p="http://schemas.openxmlformats.org/presentationml/2006/main" removePersonalInfoOnSave="1" saveSubsetFonts="1">
   <p:sldMasterIdLst>
     <p:sldMasterId id="2147483648" r:id="rId1"/>
   </p:sldMasterIdLst>
@@ -4175,17 +4175,13 @@
         </p:spPr>
         <p:txBody>
           <a:bodyPr>
-            <a:normAutofit fontScale="85000" lnSpcReduction="20000"/>
+            <a:normAutofit fontScale="70000" lnSpcReduction="20000"/>
           </a:bodyPr>
           <a:lstStyle/>
           <a:p>
             <a:r>
               <a:rPr lang="en-US" sz="2400" dirty="0"/>
-              <a:t>Things that you can potentially calculate (either via the below or the way you want) once you get all your Jira data into a </a:t>
-            </a:r>
-            <a:r>
-              <a:rPr lang="en-US" sz="2400"/>
-              <a:t>SQL database:</a:t>
+              <a:t>Things that you can potentially calculate (either via the below or the way you want) once you get all your Jira data into a SQL database:</a:t>
             </a:r>
           </a:p>
           <a:p>
@@ -4232,7 +4228,14 @@
             <a:pPr lvl="1"/>
             <a:r>
               <a:rPr lang="en-US" sz="1800" dirty="0"/>
-              <a:t>SCM tools that integrate with Jira (e.g. Git Integration for Jira) sometimes add custom “</a:t>
+              <a:t>Or if you define it further as “length of delivery phase”, it could be “Code Cycle Time” (time between first commit and final merge)</a:t>
+            </a:r>
+          </a:p>
+          <a:p>
+            <a:pPr lvl="1"/>
+            <a:r>
+              <a:rPr lang="en-US" sz="1800" dirty="0"/>
+              <a:t>SCM tools that integrate with Jira (e.g. Git Integration for Jira) may sometimes add custom “</a:t>
             </a:r>
             <a:r>
               <a:rPr lang="en-US" sz="1800" dirty="0" err="1"/>
@@ -4253,7 +4256,54 @@
             <a:pPr lvl="1"/>
             <a:r>
               <a:rPr lang="en-US" sz="1800" dirty="0"/>
-              <a:t>Look at Jira Versions, see what dates they or their constituent issues are moved to Done and perhaps correlate them with change management data?</a:t>
+              <a:t>Look at Jira Versions, see when the Version was marked Released, or the last contained issues was moved to Done (perhaps correlate that info with change management data?)</a:t>
+            </a:r>
+          </a:p>
+          <a:p>
+            <a:r>
+              <a:rPr lang="en-US" sz="2200" dirty="0"/>
+              <a:t>Additions to Sprint backlog (during Sprint execution):</a:t>
+            </a:r>
+          </a:p>
+          <a:p>
+            <a:pPr lvl="1"/>
+            <a:r>
+              <a:rPr lang="en-US" sz="1700" dirty="0">
+                <a:hlinkClick r:id="rId4"/>
+              </a:rPr>
+              <a:t>https://www.barryovereem.com/myth-2-the-sprint-backlog-cant-change-during-the-sprint/</a:t>
+            </a:r>
+            <a:endParaRPr lang="en-US" sz="1700" dirty="0"/>
+          </a:p>
+          <a:p>
+            <a:pPr lvl="1"/>
+            <a:r>
+              <a:rPr lang="en-US" sz="1800" dirty="0"/>
+              <a:t>Look at issue history where (</a:t>
+            </a:r>
+            <a:r>
+              <a:rPr lang="en-US" sz="1800" dirty="0" err="1"/>
+              <a:t>history_field</a:t>
+            </a:r>
+            <a:r>
+              <a:rPr lang="en-US" sz="1800" dirty="0"/>
+              <a:t> = ‘SPRINT’) and (</a:t>
+            </a:r>
+            <a:r>
+              <a:rPr lang="en-US" sz="1800" dirty="0" err="1"/>
+              <a:t>history_tostring</a:t>
+            </a:r>
+            <a:r>
+              <a:rPr lang="en-US" sz="1800" dirty="0"/>
+              <a:t> = &lt;sprint name&gt;) and (</a:t>
+            </a:r>
+            <a:r>
+              <a:rPr lang="en-US" sz="1800" dirty="0" err="1"/>
+              <a:t>history_datecreated</a:t>
+            </a:r>
+            <a:r>
+              <a:rPr lang="en-US" sz="1800" dirty="0"/>
+              <a:t> within &lt;sprint period&gt;)</a:t>
             </a:r>
           </a:p>
           <a:p>
@@ -4266,14 +4316,14 @@
             <a:pPr lvl="1"/>
             <a:r>
               <a:rPr lang="en-US" sz="1800" dirty="0"/>
-              <a:t>Number of contained issues in a Version, Epic or Sprint	</a:t>
+              <a:t>Total number of contained issues in a Version, Epic or Sprint	</a:t>
             </a:r>
           </a:p>
           <a:p>
             <a:pPr lvl="1"/>
             <a:r>
               <a:rPr lang="en-US" sz="1800" dirty="0"/>
-              <a:t>Different from story point total? Number of total final SCM commits? (very coarse)</a:t>
+              <a:t>Different from story point total? Number of contained issues with at least 1 SCM commit? (very coarse)</a:t>
             </a:r>
           </a:p>
           <a:p>
@@ -4286,7 +4336,7 @@
             <a:pPr lvl="1"/>
             <a:r>
               <a:rPr lang="en-US" sz="1800" dirty="0">
-                <a:hlinkClick r:id="rId4"/>
+                <a:hlinkClick r:id="rId5"/>
               </a:rPr>
               <a:t>https://coalition.agileuprising.com/t/normalizing-story-points-across-an-art/927/9</a:t>
             </a:r>
@@ -4309,7 +4359,7 @@
             <a:pPr lvl="1"/>
             <a:r>
               <a:rPr lang="en-US" sz="1700" dirty="0">
-                <a:hlinkClick r:id="rId5"/>
+                <a:hlinkClick r:id="rId6"/>
               </a:rPr>
               <a:t>https://www.guru99.com/defect-density-software-testing-terminology.html</a:t>
             </a:r>
@@ -4562,13 +4612,13 @@
             </a:r>
             <a:r>
               <a:rPr lang="en-US" sz="2400" dirty="0"/>
-              <a:t>), gadgets and email notifications</a:t>
+              <a:t>), gadgets and email notifications, typically driven from simple JQL statements</a:t>
             </a:r>
           </a:p>
           <a:p>
             <a:r>
               <a:rPr lang="en-US" sz="2400" dirty="0"/>
-              <a:t>However (with minimal code) additional simple, useful and interesting work metrics (Agile and otherwise) can be gathered from Jira</a:t>
+              <a:t>However (with minimal code) additional simple, useful and interesting work metrics (Agile and otherwise) can be gathered from Jira, using the REST API directly or via open source wrappers</a:t>
             </a:r>
           </a:p>
           <a:p>
@@ -4749,7 +4799,7 @@
         </p:spPr>
         <p:txBody>
           <a:bodyPr>
-            <a:normAutofit fontScale="92500" lnSpcReduction="20000"/>
+            <a:normAutofit fontScale="77500" lnSpcReduction="20000"/>
           </a:bodyPr>
           <a:lstStyle/>
           <a:p>
@@ -4876,7 +4926,7 @@
             <a:pPr lvl="1"/>
             <a:r>
               <a:rPr lang="en-US" sz="2800" dirty="0"/>
-              <a:t>Demo uses direct SELECT, DELETE and INSERT statements for simplicity</a:t>
+              <a:t>Demo uses direct SELECT, DELETE and INSERT statements to build the tables for simplicity, not prepared statements or parameters</a:t>
             </a:r>
           </a:p>
           <a:p>
@@ -4892,6 +4942,13 @@
             <a:r>
               <a:rPr lang="en-US" sz="2800" dirty="0"/>
               <a:t>, projects, issues, history, metrics</a:t>
+            </a:r>
+          </a:p>
+          <a:p>
+            <a:pPr lvl="1"/>
+            <a:r>
+              <a:rPr lang="en-US" sz="2800" dirty="0"/>
+              <a:t>Then we use SQL SPs to do the heavy lifting of joining, selecting and creating metrics</a:t>
             </a:r>
           </a:p>
           <a:p>
@@ -5279,13 +5336,19 @@
         </p:spPr>
         <p:txBody>
           <a:bodyPr>
-            <a:normAutofit fontScale="77500" lnSpcReduction="20000"/>
+            <a:normAutofit fontScale="70000" lnSpcReduction="20000"/>
           </a:bodyPr>
           <a:lstStyle/>
           <a:p>
             <a:r>
               <a:rPr lang="en-US" sz="3200" dirty="0"/>
               <a:t>First, talk about “improvement” vs “protective” metrics</a:t>
+            </a:r>
+          </a:p>
+          <a:p>
+            <a:r>
+              <a:rPr lang="en-US" sz="3200" dirty="0"/>
+              <a:t>Tried to pick very simple metrics definitions – every one will define them slightly differently</a:t>
             </a:r>
           </a:p>
           <a:p>
@@ -5351,7 +5414,7 @@
                   <a:srgbClr val="FF0000"/>
                 </a:solidFill>
               </a:rPr>
-              <a:t>Rework (cards moving right to left) generally means waste</a:t>
+              <a:t>Rework (issues moving right to left) generally means waste</a:t>
             </a:r>
           </a:p>
           <a:p>

</xml_diff>